<commit_message>
Incluindo exemplos do M2 C1
</commit_message>
<xml_diff>
--- a/curso/modulo2capitulo1.pptx
+++ b/curso/modulo2capitulo1.pptx
@@ -20,6 +20,14 @@
     <p:sldId id="268" r:id="rId14"/>
     <p:sldId id="269" r:id="rId15"/>
     <p:sldId id="270" r:id="rId16"/>
+    <p:sldId id="272" r:id="rId17"/>
+    <p:sldId id="273" r:id="rId18"/>
+    <p:sldId id="274" r:id="rId19"/>
+    <p:sldId id="275" r:id="rId20"/>
+    <p:sldId id="276" r:id="rId21"/>
+    <p:sldId id="277" r:id="rId22"/>
+    <p:sldId id="278" r:id="rId23"/>
+    <p:sldId id="279" r:id="rId24"/>
   </p:sldIdLst>
   <p:sldSz cx="9144000" cy="6858000" type="screen4x3"/>
   <p:notesSz cx="6858000" cy="9144000"/>
@@ -506,7 +514,7 @@
             <a:fld id="{DC997751-B773-4FFE-B439-10C23787B14F}" type="datetimeFigureOut">
               <a:rPr lang="pt-BR" smtClean="0"/>
               <a:pPr/>
-              <a:t>27/6/2015</a:t>
+              <a:t>4/7/2015</a:t>
             </a:fld>
             <a:endParaRPr lang="pt-BR"/>
           </a:p>
@@ -673,7 +681,7 @@
             <a:fld id="{DC997751-B773-4FFE-B439-10C23787B14F}" type="datetimeFigureOut">
               <a:rPr lang="pt-BR" smtClean="0"/>
               <a:pPr/>
-              <a:t>27/6/2015</a:t>
+              <a:t>4/7/2015</a:t>
             </a:fld>
             <a:endParaRPr lang="pt-BR"/>
           </a:p>
@@ -850,7 +858,7 @@
             <a:fld id="{DC997751-B773-4FFE-B439-10C23787B14F}" type="datetimeFigureOut">
               <a:rPr lang="pt-BR" smtClean="0"/>
               <a:pPr/>
-              <a:t>27/6/2015</a:t>
+              <a:t>4/7/2015</a:t>
             </a:fld>
             <a:endParaRPr lang="pt-BR"/>
           </a:p>
@@ -1021,7 +1029,7 @@
             <a:fld id="{DC997751-B773-4FFE-B439-10C23787B14F}" type="datetimeFigureOut">
               <a:rPr lang="pt-BR" smtClean="0"/>
               <a:pPr/>
-              <a:t>27/6/2015</a:t>
+              <a:t>4/7/2015</a:t>
             </a:fld>
             <a:endParaRPr lang="pt-BR"/>
           </a:p>
@@ -1478,7 +1486,7 @@
             <a:fld id="{DC997751-B773-4FFE-B439-10C23787B14F}" type="datetimeFigureOut">
               <a:rPr lang="pt-BR" smtClean="0"/>
               <a:pPr/>
-              <a:t>27/6/2015</a:t>
+              <a:t>4/7/2015</a:t>
             </a:fld>
             <a:endParaRPr lang="pt-BR"/>
           </a:p>
@@ -1744,7 +1752,7 @@
             <a:fld id="{DC997751-B773-4FFE-B439-10C23787B14F}" type="datetimeFigureOut">
               <a:rPr lang="pt-BR" smtClean="0"/>
               <a:pPr/>
-              <a:t>27/6/2015</a:t>
+              <a:t>4/7/2015</a:t>
             </a:fld>
             <a:endParaRPr lang="pt-BR"/>
           </a:p>
@@ -2120,7 +2128,7 @@
             <a:fld id="{DC997751-B773-4FFE-B439-10C23787B14F}" type="datetimeFigureOut">
               <a:rPr lang="pt-BR" smtClean="0"/>
               <a:pPr/>
-              <a:t>27/6/2015</a:t>
+              <a:t>4/7/2015</a:t>
             </a:fld>
             <a:endParaRPr lang="pt-BR"/>
           </a:p>
@@ -2244,7 +2252,7 @@
             <a:fld id="{DC997751-B773-4FFE-B439-10C23787B14F}" type="datetimeFigureOut">
               <a:rPr lang="pt-BR" smtClean="0"/>
               <a:pPr/>
-              <a:t>27/6/2015</a:t>
+              <a:t>4/7/2015</a:t>
             </a:fld>
             <a:endParaRPr lang="pt-BR"/>
           </a:p>
@@ -2336,7 +2344,7 @@
             <a:fld id="{DC997751-B773-4FFE-B439-10C23787B14F}" type="datetimeFigureOut">
               <a:rPr lang="pt-BR" smtClean="0"/>
               <a:pPr/>
-              <a:t>27/6/2015</a:t>
+              <a:t>4/7/2015</a:t>
             </a:fld>
             <a:endParaRPr lang="pt-BR"/>
           </a:p>
@@ -2587,7 +2595,7 @@
             <a:fld id="{DC997751-B773-4FFE-B439-10C23787B14F}" type="datetimeFigureOut">
               <a:rPr lang="pt-BR" smtClean="0"/>
               <a:pPr/>
-              <a:t>27/6/2015</a:t>
+              <a:t>4/7/2015</a:t>
             </a:fld>
             <a:endParaRPr lang="pt-BR"/>
           </a:p>
@@ -2848,7 +2856,7 @@
             <a:fld id="{DC997751-B773-4FFE-B439-10C23787B14F}" type="datetimeFigureOut">
               <a:rPr lang="pt-BR" smtClean="0"/>
               <a:pPr/>
-              <a:t>27/6/2015</a:t>
+              <a:t>4/7/2015</a:t>
             </a:fld>
             <a:endParaRPr lang="pt-BR"/>
           </a:p>
@@ -3254,7 +3262,7 @@
             <a:fld id="{DC997751-B773-4FFE-B439-10C23787B14F}" type="datetimeFigureOut">
               <a:rPr lang="pt-BR" smtClean="0"/>
               <a:pPr/>
-              <a:t>27/6/2015</a:t>
+              <a:t>4/7/2015</a:t>
             </a:fld>
             <a:endParaRPr lang="pt-BR"/>
           </a:p>
@@ -3677,30 +3685,14 @@
           <a:p>
             <a:r>
               <a:rPr lang="pt-BR" dirty="0" smtClean="0"/>
-              <a:t>Módulo </a:t>
-            </a:r>
-            <a:r>
-              <a:rPr lang="pt-BR" dirty="0" smtClean="0"/>
-              <a:t>II</a:t>
-            </a:r>
-            <a:r>
-              <a:rPr lang="pt-BR" dirty="0" smtClean="0"/>
-              <a:t/>
+              <a:t>Módulo II</a:t>
             </a:r>
             <a:br>
               <a:rPr lang="pt-BR" dirty="0" smtClean="0"/>
             </a:br>
             <a:r>
               <a:rPr lang="pt-BR" dirty="0" smtClean="0"/>
-              <a:t>Capítulo </a:t>
-            </a:r>
-            <a:r>
-              <a:rPr lang="pt-BR" dirty="0" smtClean="0"/>
-              <a:t>1:</a:t>
-            </a:r>
-            <a:r>
-              <a:rPr lang="pt-BR" dirty="0" smtClean="0"/>
-              <a:t/>
+              <a:t>Capítulo 1:</a:t>
             </a:r>
             <a:br>
               <a:rPr lang="pt-BR" dirty="0" smtClean="0"/>
@@ -4466,7 +4458,7 @@
         <p:spPr/>
         <p:txBody>
           <a:bodyPr>
-            <a:normAutofit lnSpcReduction="10000"/>
+            <a:normAutofit fontScale="92500" lnSpcReduction="20000"/>
           </a:bodyPr>
           <a:lstStyle/>
           <a:p>
@@ -4530,8 +4522,35 @@
             </a:r>
             <a:r>
               <a:rPr lang="pt-BR" dirty="0" smtClean="0"/>
-              <a:t>, até mesmo instâncias de outras classes!</a:t>
-            </a:r>
+              <a:t>, até mesmo instâncias de outras classes</a:t>
+            </a:r>
+            <a:r>
+              <a:rPr lang="pt-BR" dirty="0" smtClean="0"/>
+              <a:t>!</a:t>
+            </a:r>
+          </a:p>
+          <a:p>
+            <a:r>
+              <a:rPr lang="pt-BR" dirty="0" smtClean="0"/>
+              <a:t>Para não confundir os atributos da classe com variáveis locais, usamos </a:t>
+            </a:r>
+            <a:r>
+              <a:rPr lang="pt-BR" b="1" dirty="0" err="1" smtClean="0">
+                <a:solidFill>
+                  <a:srgbClr val="92D050"/>
+                </a:solidFill>
+                <a:latin typeface="Courier New" pitchFamily="49" charset="0"/>
+                <a:cs typeface="Courier New" pitchFamily="49" charset="0"/>
+              </a:rPr>
+              <a:t>this</a:t>
+            </a:r>
+            <a:endParaRPr lang="pt-BR" b="1" dirty="0" smtClean="0">
+              <a:solidFill>
+                <a:srgbClr val="92D050"/>
+              </a:solidFill>
+              <a:latin typeface="Courier New" pitchFamily="49" charset="0"/>
+              <a:cs typeface="Courier New" pitchFamily="49" charset="0"/>
+            </a:endParaRPr>
           </a:p>
         </p:txBody>
       </p:sp>
@@ -4689,6 +4708,530 @@
 </p:sld>
 </file>
 
+<file path=ppt/slides/slide16.xml><?xml version="1.0" encoding="utf-8"?>
+<p:sld xmlns:a="http://schemas.openxmlformats.org/drawingml/2006/main" xmlns:r="http://schemas.openxmlformats.org/officeDocument/2006/relationships" xmlns:p="http://schemas.openxmlformats.org/presentationml/2006/main">
+  <p:cSld>
+    <p:spTree>
+      <p:nvGrpSpPr>
+        <p:cNvPr id="1" name=""/>
+        <p:cNvGrpSpPr/>
+        <p:nvPr/>
+      </p:nvGrpSpPr>
+      <p:grpSpPr>
+        <a:xfrm>
+          <a:off x="0" y="0"/>
+          <a:ext cx="0" cy="0"/>
+          <a:chOff x="0" y="0"/>
+          <a:chExt cx="0" cy="0"/>
+        </a:xfrm>
+      </p:grpSpPr>
+      <p:sp>
+        <p:nvSpPr>
+          <p:cNvPr id="2" name="Título 1"/>
+          <p:cNvSpPr>
+            <a:spLocks noGrp="1"/>
+          </p:cNvSpPr>
+          <p:nvPr>
+            <p:ph type="title"/>
+          </p:nvPr>
+        </p:nvSpPr>
+        <p:spPr/>
+        <p:txBody>
+          <a:bodyPr/>
+          <a:lstStyle/>
+          <a:p>
+            <a:r>
+              <a:rPr lang="pt-BR" dirty="0" smtClean="0"/>
+              <a:t>Método Construtor</a:t>
+            </a:r>
+            <a:endParaRPr lang="pt-BR" dirty="0"/>
+          </a:p>
+        </p:txBody>
+      </p:sp>
+      <p:sp>
+        <p:nvSpPr>
+          <p:cNvPr id="3" name="Espaço Reservado para Conteúdo 2"/>
+          <p:cNvSpPr>
+            <a:spLocks noGrp="1"/>
+          </p:cNvSpPr>
+          <p:nvPr>
+            <p:ph idx="1"/>
+          </p:nvPr>
+        </p:nvSpPr>
+        <p:spPr/>
+        <p:txBody>
+          <a:bodyPr>
+            <a:normAutofit/>
+          </a:bodyPr>
+          <a:lstStyle/>
+          <a:p>
+            <a:r>
+              <a:rPr lang="pt-BR" dirty="0" smtClean="0"/>
+              <a:t>O </a:t>
+            </a:r>
+            <a:r>
+              <a:rPr lang="pt-BR" dirty="0" smtClean="0">
+                <a:solidFill>
+                  <a:srgbClr val="92D050"/>
+                </a:solidFill>
+              </a:rPr>
+              <a:t>m</a:t>
+            </a:r>
+            <a:r>
+              <a:rPr lang="pt-BR" dirty="0" smtClean="0">
+                <a:solidFill>
+                  <a:srgbClr val="92D050"/>
+                </a:solidFill>
+              </a:rPr>
+              <a:t>étodo </a:t>
+            </a:r>
+            <a:r>
+              <a:rPr lang="pt-BR" dirty="0" smtClean="0">
+                <a:solidFill>
+                  <a:srgbClr val="92D050"/>
+                </a:solidFill>
+              </a:rPr>
+              <a:t>c</a:t>
+            </a:r>
+            <a:r>
+              <a:rPr lang="pt-BR" dirty="0" smtClean="0">
+                <a:solidFill>
+                  <a:srgbClr val="92D050"/>
+                </a:solidFill>
+              </a:rPr>
+              <a:t>onstrutor</a:t>
+            </a:r>
+            <a:r>
+              <a:rPr lang="pt-BR" dirty="0" smtClean="0"/>
+              <a:t> é um método especial que é chamado no momento em que a classe é instanciada</a:t>
+            </a:r>
+          </a:p>
+          <a:p>
+            <a:r>
+              <a:rPr lang="pt-BR" dirty="0" smtClean="0"/>
+              <a:t>A definição do método construtor é </a:t>
+            </a:r>
+            <a:r>
+              <a:rPr lang="pt-BR" dirty="0" smtClean="0">
+                <a:solidFill>
+                  <a:srgbClr val="92D050"/>
+                </a:solidFill>
+              </a:rPr>
+              <a:t>opcional</a:t>
+            </a:r>
+          </a:p>
+          <a:p>
+            <a:r>
+              <a:rPr lang="pt-BR" dirty="0" smtClean="0"/>
+              <a:t>O construtor deve ter o </a:t>
+            </a:r>
+            <a:r>
+              <a:rPr lang="pt-BR" dirty="0" smtClean="0">
+                <a:solidFill>
+                  <a:srgbClr val="92D050"/>
+                </a:solidFill>
+              </a:rPr>
+              <a:t>mesmo nome </a:t>
+            </a:r>
+            <a:r>
+              <a:rPr lang="pt-BR" dirty="0" smtClean="0"/>
+              <a:t>que a classe</a:t>
+            </a:r>
+          </a:p>
+          <a:p>
+            <a:r>
+              <a:rPr lang="pt-BR" dirty="0" smtClean="0"/>
+              <a:t>O construtor não retorna valor</a:t>
+            </a:r>
+          </a:p>
+          <a:p>
+            <a:endParaRPr lang="pt-BR" dirty="0" smtClean="0"/>
+          </a:p>
+        </p:txBody>
+      </p:sp>
+    </p:spTree>
+  </p:cSld>
+  <p:clrMapOvr>
+    <a:masterClrMapping/>
+  </p:clrMapOvr>
+</p:sld>
+</file>
+
+<file path=ppt/slides/slide17.xml><?xml version="1.0" encoding="utf-8"?>
+<p:sld xmlns:a="http://schemas.openxmlformats.org/drawingml/2006/main" xmlns:r="http://schemas.openxmlformats.org/officeDocument/2006/relationships" xmlns:p="http://schemas.openxmlformats.org/presentationml/2006/main">
+  <p:cSld>
+    <p:spTree>
+      <p:nvGrpSpPr>
+        <p:cNvPr id="1" name=""/>
+        <p:cNvGrpSpPr/>
+        <p:nvPr/>
+      </p:nvGrpSpPr>
+      <p:grpSpPr>
+        <a:xfrm>
+          <a:off x="0" y="0"/>
+          <a:ext cx="0" cy="0"/>
+          <a:chOff x="0" y="0"/>
+          <a:chExt cx="0" cy="0"/>
+        </a:xfrm>
+      </p:grpSpPr>
+      <p:sp>
+        <p:nvSpPr>
+          <p:cNvPr id="2" name="Título 1"/>
+          <p:cNvSpPr>
+            <a:spLocks noGrp="1"/>
+          </p:cNvSpPr>
+          <p:nvPr>
+            <p:ph type="title"/>
+          </p:nvPr>
+        </p:nvSpPr>
+        <p:spPr/>
+        <p:txBody>
+          <a:bodyPr/>
+          <a:lstStyle/>
+          <a:p>
+            <a:r>
+              <a:rPr lang="pt-BR" dirty="0" smtClean="0"/>
+              <a:t>Método Construtor</a:t>
+            </a:r>
+            <a:endParaRPr lang="pt-BR" dirty="0"/>
+          </a:p>
+        </p:txBody>
+      </p:sp>
+      <p:sp>
+        <p:nvSpPr>
+          <p:cNvPr id="3" name="Espaço Reservado para Conteúdo 2"/>
+          <p:cNvSpPr>
+            <a:spLocks noGrp="1"/>
+          </p:cNvSpPr>
+          <p:nvPr>
+            <p:ph idx="1"/>
+          </p:nvPr>
+        </p:nvSpPr>
+        <p:spPr/>
+        <p:txBody>
+          <a:bodyPr>
+            <a:normAutofit lnSpcReduction="10000"/>
+          </a:bodyPr>
+          <a:lstStyle/>
+          <a:p>
+            <a:r>
+              <a:rPr lang="pt-BR" dirty="0" smtClean="0"/>
+              <a:t>O objetivo do método construtor é a </a:t>
+            </a:r>
+            <a:r>
+              <a:rPr lang="pt-BR" dirty="0" smtClean="0">
+                <a:solidFill>
+                  <a:srgbClr val="92D050"/>
+                </a:solidFill>
+              </a:rPr>
+              <a:t>inicialização de </a:t>
+            </a:r>
+            <a:r>
+              <a:rPr lang="pt-BR" dirty="0" smtClean="0">
+                <a:solidFill>
+                  <a:srgbClr val="92D050"/>
+                </a:solidFill>
+              </a:rPr>
+              <a:t>atributos</a:t>
+            </a:r>
+          </a:p>
+          <a:p>
+            <a:r>
+              <a:rPr lang="pt-BR" dirty="0" smtClean="0"/>
+              <a:t>O </a:t>
+            </a:r>
+            <a:r>
+              <a:rPr lang="pt-BR" dirty="0" smtClean="0"/>
+              <a:t>método construtor pode receber parâmetros, e estes deverão ser passados no momento da </a:t>
+            </a:r>
+            <a:r>
+              <a:rPr lang="pt-BR" dirty="0" smtClean="0"/>
+              <a:t>inicialização</a:t>
+            </a:r>
+          </a:p>
+          <a:p>
+            <a:r>
+              <a:rPr lang="pt-BR" dirty="0" smtClean="0"/>
+              <a:t>Construtor é um método, e por isso pode ser </a:t>
+            </a:r>
+            <a:r>
+              <a:rPr lang="pt-BR" dirty="0" smtClean="0">
+                <a:solidFill>
+                  <a:srgbClr val="92D050"/>
+                </a:solidFill>
+              </a:rPr>
+              <a:t>sobrecarregado</a:t>
+            </a:r>
+            <a:r>
+              <a:rPr lang="pt-BR" dirty="0" smtClean="0"/>
+              <a:t> também</a:t>
+            </a:r>
+          </a:p>
+          <a:p>
+            <a:r>
+              <a:rPr lang="pt-BR" dirty="0" smtClean="0">
+                <a:solidFill>
+                  <a:srgbClr val="92D050"/>
+                </a:solidFill>
+              </a:rPr>
+              <a:t>Encadeamento de construtores</a:t>
+            </a:r>
+            <a:r>
+              <a:rPr lang="pt-BR" dirty="0" smtClean="0"/>
+              <a:t> permite chamar um construtor (sobrecarga) a partir de outro construtor</a:t>
+            </a:r>
+            <a:endParaRPr lang="pt-BR" dirty="0" smtClean="0"/>
+          </a:p>
+          <a:p>
+            <a:endParaRPr lang="pt-BR" dirty="0"/>
+          </a:p>
+        </p:txBody>
+      </p:sp>
+    </p:spTree>
+  </p:cSld>
+  <p:clrMapOvr>
+    <a:masterClrMapping/>
+  </p:clrMapOvr>
+</p:sld>
+</file>
+
+<file path=ppt/slides/slide18.xml><?xml version="1.0" encoding="utf-8"?>
+<p:sld xmlns:a="http://schemas.openxmlformats.org/drawingml/2006/main" xmlns:r="http://schemas.openxmlformats.org/officeDocument/2006/relationships" xmlns:p="http://schemas.openxmlformats.org/presentationml/2006/main">
+  <p:cSld>
+    <p:spTree>
+      <p:nvGrpSpPr>
+        <p:cNvPr id="1" name=""/>
+        <p:cNvGrpSpPr/>
+        <p:nvPr/>
+      </p:nvGrpSpPr>
+      <p:grpSpPr>
+        <a:xfrm>
+          <a:off x="0" y="0"/>
+          <a:ext cx="0" cy="0"/>
+          <a:chOff x="0" y="0"/>
+          <a:chExt cx="0" cy="0"/>
+        </a:xfrm>
+      </p:grpSpPr>
+      <p:sp>
+        <p:nvSpPr>
+          <p:cNvPr id="2" name="Título 1"/>
+          <p:cNvSpPr>
+            <a:spLocks noGrp="1"/>
+          </p:cNvSpPr>
+          <p:nvPr>
+            <p:ph type="title"/>
+          </p:nvPr>
+        </p:nvSpPr>
+        <p:spPr/>
+        <p:txBody>
+          <a:bodyPr/>
+          <a:lstStyle/>
+          <a:p>
+            <a:r>
+              <a:rPr lang="pt-BR" dirty="0" smtClean="0"/>
+              <a:t>Modificadores de Acesso</a:t>
+            </a:r>
+            <a:endParaRPr lang="pt-BR" dirty="0"/>
+          </a:p>
+        </p:txBody>
+      </p:sp>
+      <p:sp>
+        <p:nvSpPr>
+          <p:cNvPr id="3" name="Espaço Reservado para Conteúdo 2"/>
+          <p:cNvSpPr>
+            <a:spLocks noGrp="1"/>
+          </p:cNvSpPr>
+          <p:nvPr>
+            <p:ph idx="1"/>
+          </p:nvPr>
+        </p:nvSpPr>
+        <p:spPr/>
+        <p:txBody>
+          <a:bodyPr/>
+          <a:lstStyle/>
+          <a:p>
+            <a:r>
+              <a:rPr lang="pt-BR" dirty="0" smtClean="0">
+                <a:solidFill>
+                  <a:srgbClr val="92D050"/>
+                </a:solidFill>
+              </a:rPr>
+              <a:t>Modificadores de acesso</a:t>
+            </a:r>
+            <a:r>
+              <a:rPr lang="pt-BR" dirty="0" smtClean="0"/>
+              <a:t> configuram a visibilidade de atributos e métodos</a:t>
+            </a:r>
+          </a:p>
+          <a:p>
+            <a:r>
+              <a:rPr lang="pt-BR" dirty="0" smtClean="0"/>
+              <a:t>C# tem 4 modificadores de acesso:</a:t>
+            </a:r>
+          </a:p>
+          <a:p>
+            <a:r>
+              <a:rPr lang="pt-BR" b="1" dirty="0" err="1" smtClean="0">
+                <a:solidFill>
+                  <a:srgbClr val="92D050"/>
+                </a:solidFill>
+                <a:latin typeface="Courier New" pitchFamily="49" charset="0"/>
+                <a:cs typeface="Courier New" pitchFamily="49" charset="0"/>
+              </a:rPr>
+              <a:t>public</a:t>
+            </a:r>
+            <a:r>
+              <a:rPr lang="pt-BR" dirty="0" smtClean="0"/>
+              <a:t>: podem ser acessados de qualquer lugar</a:t>
+            </a:r>
+          </a:p>
+          <a:p>
+            <a:r>
+              <a:rPr lang="pt-BR" b="1" dirty="0" err="1" smtClean="0">
+                <a:solidFill>
+                  <a:srgbClr val="92D050"/>
+                </a:solidFill>
+                <a:latin typeface="Courier New" pitchFamily="49" charset="0"/>
+                <a:cs typeface="Courier New" pitchFamily="49" charset="0"/>
+              </a:rPr>
+              <a:t>private</a:t>
+            </a:r>
+            <a:r>
+              <a:rPr lang="pt-BR" dirty="0" smtClean="0"/>
+              <a:t>: podem ser acessados apenas pela própria classe</a:t>
+            </a:r>
+          </a:p>
+        </p:txBody>
+      </p:sp>
+    </p:spTree>
+  </p:cSld>
+  <p:clrMapOvr>
+    <a:masterClrMapping/>
+  </p:clrMapOvr>
+</p:sld>
+</file>
+
+<file path=ppt/slides/slide19.xml><?xml version="1.0" encoding="utf-8"?>
+<p:sld xmlns:a="http://schemas.openxmlformats.org/drawingml/2006/main" xmlns:r="http://schemas.openxmlformats.org/officeDocument/2006/relationships" xmlns:p="http://schemas.openxmlformats.org/presentationml/2006/main">
+  <p:cSld>
+    <p:spTree>
+      <p:nvGrpSpPr>
+        <p:cNvPr id="1" name=""/>
+        <p:cNvGrpSpPr/>
+        <p:nvPr/>
+      </p:nvGrpSpPr>
+      <p:grpSpPr>
+        <a:xfrm>
+          <a:off x="0" y="0"/>
+          <a:ext cx="0" cy="0"/>
+          <a:chOff x="0" y="0"/>
+          <a:chExt cx="0" cy="0"/>
+        </a:xfrm>
+      </p:grpSpPr>
+      <p:sp>
+        <p:nvSpPr>
+          <p:cNvPr id="2" name="Título 1"/>
+          <p:cNvSpPr>
+            <a:spLocks noGrp="1"/>
+          </p:cNvSpPr>
+          <p:nvPr>
+            <p:ph type="title"/>
+          </p:nvPr>
+        </p:nvSpPr>
+        <p:spPr/>
+        <p:txBody>
+          <a:bodyPr/>
+          <a:lstStyle/>
+          <a:p>
+            <a:r>
+              <a:rPr lang="pt-BR" dirty="0" smtClean="0"/>
+              <a:t>Modificadores de Acesso</a:t>
+            </a:r>
+            <a:endParaRPr lang="pt-BR" dirty="0"/>
+          </a:p>
+        </p:txBody>
+      </p:sp>
+      <p:sp>
+        <p:nvSpPr>
+          <p:cNvPr id="3" name="Espaço Reservado para Conteúdo 2"/>
+          <p:cNvSpPr>
+            <a:spLocks noGrp="1"/>
+          </p:cNvSpPr>
+          <p:nvPr>
+            <p:ph idx="1"/>
+          </p:nvPr>
+        </p:nvSpPr>
+        <p:spPr/>
+        <p:txBody>
+          <a:bodyPr/>
+          <a:lstStyle/>
+          <a:p>
+            <a:r>
+              <a:rPr lang="pt-BR" b="1" dirty="0" err="1" smtClean="0">
+                <a:solidFill>
+                  <a:srgbClr val="92D050"/>
+                </a:solidFill>
+                <a:latin typeface="Courier New" pitchFamily="49" charset="0"/>
+                <a:cs typeface="Courier New" pitchFamily="49" charset="0"/>
+              </a:rPr>
+              <a:t>protected</a:t>
+            </a:r>
+            <a:r>
+              <a:rPr lang="pt-BR" dirty="0" smtClean="0"/>
+              <a:t>: podem ser acessados apenas pela própria classe, pelas classes ancestrais e descendentes</a:t>
+            </a:r>
+          </a:p>
+          <a:p>
+            <a:r>
+              <a:rPr lang="pt-BR" b="1" dirty="0" err="1" smtClean="0">
+                <a:solidFill>
+                  <a:srgbClr val="92D050"/>
+                </a:solidFill>
+                <a:latin typeface="Courier New" pitchFamily="49" charset="0"/>
+                <a:cs typeface="Courier New" pitchFamily="49" charset="0"/>
+              </a:rPr>
+              <a:t>internal</a:t>
+            </a:r>
+            <a:r>
+              <a:rPr lang="pt-BR" dirty="0" smtClean="0"/>
+              <a:t>: podem ser acessados apenas pelo mesmo </a:t>
+            </a:r>
+            <a:r>
+              <a:rPr lang="pt-BR" i="1" dirty="0" err="1" smtClean="0"/>
+              <a:t>assembly</a:t>
+            </a:r>
+            <a:r>
+              <a:rPr lang="pt-BR" dirty="0" smtClean="0"/>
+              <a:t> (EXE ou DLL)</a:t>
+            </a:r>
+          </a:p>
+          <a:p>
+            <a:r>
+              <a:rPr lang="pt-BR" dirty="0" smtClean="0"/>
+              <a:t>Por padrão, todos os membros são </a:t>
+            </a:r>
+            <a:r>
+              <a:rPr lang="pt-BR" b="1" dirty="0" err="1" smtClean="0">
+                <a:latin typeface="Courier New" pitchFamily="49" charset="0"/>
+                <a:cs typeface="Courier New" pitchFamily="49" charset="0"/>
+              </a:rPr>
+              <a:t>private</a:t>
+            </a:r>
+            <a:endParaRPr lang="pt-BR" b="1" dirty="0" smtClean="0">
+              <a:latin typeface="Courier New" pitchFamily="49" charset="0"/>
+              <a:cs typeface="Courier New" pitchFamily="49" charset="0"/>
+            </a:endParaRPr>
+          </a:p>
+        </p:txBody>
+      </p:sp>
+    </p:spTree>
+  </p:cSld>
+  <p:clrMapOvr>
+    <a:masterClrMapping/>
+  </p:clrMapOvr>
+</p:sld>
+</file>
+
 <file path=ppt/slides/slide2.xml><?xml version="1.0" encoding="utf-8"?>
 <p:sld xmlns:a="http://schemas.openxmlformats.org/drawingml/2006/main" xmlns:r="http://schemas.openxmlformats.org/officeDocument/2006/relationships" xmlns:p="http://schemas.openxmlformats.org/presentationml/2006/main">
   <p:cSld>
@@ -4808,6 +5351,496 @@
       </p:par>
     </p:tnLst>
   </p:timing>
+</p:sld>
+</file>
+
+<file path=ppt/slides/slide20.xml><?xml version="1.0" encoding="utf-8"?>
+<p:sld xmlns:a="http://schemas.openxmlformats.org/drawingml/2006/main" xmlns:r="http://schemas.openxmlformats.org/officeDocument/2006/relationships" xmlns:p="http://schemas.openxmlformats.org/presentationml/2006/main">
+  <p:cSld>
+    <p:spTree>
+      <p:nvGrpSpPr>
+        <p:cNvPr id="1" name=""/>
+        <p:cNvGrpSpPr/>
+        <p:nvPr/>
+      </p:nvGrpSpPr>
+      <p:grpSpPr>
+        <a:xfrm>
+          <a:off x="0" y="0"/>
+          <a:ext cx="0" cy="0"/>
+          <a:chOff x="0" y="0"/>
+          <a:chExt cx="0" cy="0"/>
+        </a:xfrm>
+      </p:grpSpPr>
+      <p:sp>
+        <p:nvSpPr>
+          <p:cNvPr id="2" name="Título 1"/>
+          <p:cNvSpPr>
+            <a:spLocks noGrp="1"/>
+          </p:cNvSpPr>
+          <p:nvPr>
+            <p:ph type="title"/>
+          </p:nvPr>
+        </p:nvSpPr>
+        <p:spPr/>
+        <p:txBody>
+          <a:bodyPr/>
+          <a:lstStyle/>
+          <a:p>
+            <a:r>
+              <a:rPr lang="pt-BR" dirty="0" err="1" smtClean="0"/>
+              <a:t>Encapsulamento</a:t>
+            </a:r>
+            <a:endParaRPr lang="pt-BR" dirty="0"/>
+          </a:p>
+        </p:txBody>
+      </p:sp>
+      <p:sp>
+        <p:nvSpPr>
+          <p:cNvPr id="3" name="Espaço Reservado para Conteúdo 2"/>
+          <p:cNvSpPr>
+            <a:spLocks noGrp="1"/>
+          </p:cNvSpPr>
+          <p:nvPr>
+            <p:ph idx="1"/>
+          </p:nvPr>
+        </p:nvSpPr>
+        <p:spPr/>
+        <p:txBody>
+          <a:bodyPr>
+            <a:normAutofit fontScale="92500" lnSpcReduction="10000"/>
+          </a:bodyPr>
+          <a:lstStyle/>
+          <a:p>
+            <a:r>
+              <a:rPr lang="pt-BR" dirty="0" smtClean="0"/>
+              <a:t>Uma das principais vantagens do uso de programação orientada a objetos, é que o objeto </a:t>
+            </a:r>
+            <a:r>
+              <a:rPr lang="pt-BR" dirty="0" smtClean="0">
+                <a:solidFill>
+                  <a:srgbClr val="92D050"/>
+                </a:solidFill>
+              </a:rPr>
+              <a:t>não precisa revelar</a:t>
+            </a:r>
+            <a:r>
+              <a:rPr lang="pt-BR" dirty="0" smtClean="0"/>
+              <a:t> todos os seus atributos e métodos</a:t>
+            </a:r>
+          </a:p>
+          <a:p>
+            <a:r>
+              <a:rPr lang="pt-BR" dirty="0" smtClean="0"/>
+              <a:t>Em um bom projeto OO, um objeto </a:t>
+            </a:r>
+            <a:r>
+              <a:rPr lang="pt-BR" dirty="0" smtClean="0">
+                <a:solidFill>
+                  <a:srgbClr val="92D050"/>
+                </a:solidFill>
+              </a:rPr>
+              <a:t>só deve revelar</a:t>
+            </a:r>
+            <a:r>
+              <a:rPr lang="pt-BR" dirty="0" smtClean="0"/>
+              <a:t> os atributos e métodos que outros objetos devem ter </a:t>
+            </a:r>
+            <a:r>
+              <a:rPr lang="pt-BR" dirty="0" smtClean="0">
+                <a:solidFill>
+                  <a:srgbClr val="92D050"/>
+                </a:solidFill>
+              </a:rPr>
+              <a:t>para interagir com ele</a:t>
+            </a:r>
+          </a:p>
+          <a:p>
+            <a:r>
+              <a:rPr lang="pt-BR" dirty="0" smtClean="0"/>
+              <a:t>Os detalhes não pertinentes para a utilização do objeto </a:t>
+            </a:r>
+            <a:r>
+              <a:rPr lang="pt-BR" dirty="0" smtClean="0">
+                <a:solidFill>
+                  <a:srgbClr val="92D050"/>
+                </a:solidFill>
+              </a:rPr>
+              <a:t>devem estar ocultos</a:t>
+            </a:r>
+            <a:r>
+              <a:rPr lang="pt-BR" dirty="0" smtClean="0"/>
+              <a:t> de todos os outros objetos</a:t>
+            </a:r>
+            <a:endParaRPr lang="pt-BR" dirty="0"/>
+          </a:p>
+        </p:txBody>
+      </p:sp>
+    </p:spTree>
+  </p:cSld>
+  <p:clrMapOvr>
+    <a:masterClrMapping/>
+  </p:clrMapOvr>
+</p:sld>
+</file>
+
+<file path=ppt/slides/slide21.xml><?xml version="1.0" encoding="utf-8"?>
+<p:sld xmlns:a="http://schemas.openxmlformats.org/drawingml/2006/main" xmlns:r="http://schemas.openxmlformats.org/officeDocument/2006/relationships" xmlns:p="http://schemas.openxmlformats.org/presentationml/2006/main">
+  <p:cSld>
+    <p:spTree>
+      <p:nvGrpSpPr>
+        <p:cNvPr id="1" name=""/>
+        <p:cNvGrpSpPr/>
+        <p:nvPr/>
+      </p:nvGrpSpPr>
+      <p:grpSpPr>
+        <a:xfrm>
+          <a:off x="0" y="0"/>
+          <a:ext cx="0" cy="0"/>
+          <a:chOff x="0" y="0"/>
+          <a:chExt cx="0" cy="0"/>
+        </a:xfrm>
+      </p:grpSpPr>
+      <p:sp>
+        <p:nvSpPr>
+          <p:cNvPr id="2" name="Título 1"/>
+          <p:cNvSpPr>
+            <a:spLocks noGrp="1"/>
+          </p:cNvSpPr>
+          <p:nvPr>
+            <p:ph type="title"/>
+          </p:nvPr>
+        </p:nvSpPr>
+        <p:spPr/>
+        <p:txBody>
+          <a:bodyPr/>
+          <a:lstStyle/>
+          <a:p>
+            <a:r>
+              <a:rPr lang="pt-BR" dirty="0" err="1" smtClean="0"/>
+              <a:t>Encapsulamento</a:t>
+            </a:r>
+            <a:endParaRPr lang="pt-BR" dirty="0"/>
+          </a:p>
+        </p:txBody>
+      </p:sp>
+      <p:sp>
+        <p:nvSpPr>
+          <p:cNvPr id="3" name="Espaço Reservado para Conteúdo 2"/>
+          <p:cNvSpPr>
+            <a:spLocks noGrp="1"/>
+          </p:cNvSpPr>
+          <p:nvPr>
+            <p:ph idx="1"/>
+          </p:nvPr>
+        </p:nvSpPr>
+        <p:spPr/>
+        <p:txBody>
+          <a:bodyPr/>
+          <a:lstStyle/>
+          <a:p>
+            <a:r>
+              <a:rPr lang="pt-BR" dirty="0" err="1" smtClean="0">
+                <a:solidFill>
+                  <a:srgbClr val="92D050"/>
+                </a:solidFill>
+              </a:rPr>
+              <a:t>Encapsulamento</a:t>
+            </a:r>
+            <a:r>
+              <a:rPr lang="pt-BR" dirty="0" smtClean="0"/>
+              <a:t> significa juntar o programa em partes, o mais </a:t>
+            </a:r>
+            <a:r>
+              <a:rPr lang="pt-BR" dirty="0" smtClean="0">
+                <a:solidFill>
+                  <a:srgbClr val="92D050"/>
+                </a:solidFill>
+              </a:rPr>
+              <a:t>isoladas</a:t>
+            </a:r>
+            <a:r>
+              <a:rPr lang="pt-BR" dirty="0" smtClean="0"/>
+              <a:t> possível</a:t>
+            </a:r>
+          </a:p>
+          <a:p>
+            <a:r>
+              <a:rPr lang="pt-BR" dirty="0" smtClean="0"/>
+              <a:t>Quanto </a:t>
+            </a:r>
+            <a:r>
+              <a:rPr lang="pt-BR" dirty="0" smtClean="0">
+                <a:solidFill>
+                  <a:srgbClr val="92D050"/>
+                </a:solidFill>
+              </a:rPr>
+              <a:t>mais independente</a:t>
+            </a:r>
+            <a:r>
+              <a:rPr lang="pt-BR" dirty="0" smtClean="0"/>
+              <a:t> cada parte for de outra parte, mais fácil é a </a:t>
+            </a:r>
+            <a:r>
+              <a:rPr lang="pt-BR" dirty="0" smtClean="0">
+                <a:solidFill>
+                  <a:srgbClr val="92D050"/>
+                </a:solidFill>
+              </a:rPr>
+              <a:t>manutenção</a:t>
+            </a:r>
+          </a:p>
+          <a:p>
+            <a:r>
+              <a:rPr lang="pt-BR" dirty="0" smtClean="0"/>
+              <a:t>Com isso o software se torna mais flexível, fácil de modificar e de criar novas implementações</a:t>
+            </a:r>
+          </a:p>
+        </p:txBody>
+      </p:sp>
+    </p:spTree>
+  </p:cSld>
+  <p:clrMapOvr>
+    <a:masterClrMapping/>
+  </p:clrMapOvr>
+</p:sld>
+</file>
+
+<file path=ppt/slides/slide22.xml><?xml version="1.0" encoding="utf-8"?>
+<p:sld xmlns:a="http://schemas.openxmlformats.org/drawingml/2006/main" xmlns:r="http://schemas.openxmlformats.org/officeDocument/2006/relationships" xmlns:p="http://schemas.openxmlformats.org/presentationml/2006/main">
+  <p:cSld>
+    <p:spTree>
+      <p:nvGrpSpPr>
+        <p:cNvPr id="1" name=""/>
+        <p:cNvGrpSpPr/>
+        <p:nvPr/>
+      </p:nvGrpSpPr>
+      <p:grpSpPr>
+        <a:xfrm>
+          <a:off x="0" y="0"/>
+          <a:ext cx="0" cy="0"/>
+          <a:chOff x="0" y="0"/>
+          <a:chExt cx="0" cy="0"/>
+        </a:xfrm>
+      </p:grpSpPr>
+      <p:sp>
+        <p:nvSpPr>
+          <p:cNvPr id="2" name="Título 1"/>
+          <p:cNvSpPr>
+            <a:spLocks noGrp="1"/>
+          </p:cNvSpPr>
+          <p:nvPr>
+            <p:ph type="title"/>
+          </p:nvPr>
+        </p:nvSpPr>
+        <p:spPr/>
+        <p:txBody>
+          <a:bodyPr/>
+          <a:lstStyle/>
+          <a:p>
+            <a:r>
+              <a:rPr lang="pt-BR" dirty="0" err="1" smtClean="0"/>
+              <a:t>Encapsulamento</a:t>
+            </a:r>
+            <a:endParaRPr lang="pt-BR" dirty="0"/>
+          </a:p>
+        </p:txBody>
+      </p:sp>
+      <p:sp>
+        <p:nvSpPr>
+          <p:cNvPr id="3" name="Espaço Reservado para Conteúdo 2"/>
+          <p:cNvSpPr>
+            <a:spLocks noGrp="1"/>
+          </p:cNvSpPr>
+          <p:nvPr>
+            <p:ph idx="1"/>
+          </p:nvPr>
+        </p:nvSpPr>
+        <p:spPr/>
+        <p:txBody>
+          <a:bodyPr/>
+          <a:lstStyle/>
+          <a:p>
+            <a:r>
+              <a:rPr lang="pt-BR" dirty="0" err="1" smtClean="0"/>
+              <a:t>Encapsulamento</a:t>
+            </a:r>
+            <a:r>
+              <a:rPr lang="pt-BR" dirty="0" smtClean="0"/>
+              <a:t> = </a:t>
+            </a:r>
+            <a:r>
+              <a:rPr lang="pt-BR" dirty="0" smtClean="0">
+                <a:solidFill>
+                  <a:srgbClr val="92D050"/>
+                </a:solidFill>
+              </a:rPr>
+              <a:t>ocultar o máximo possível</a:t>
+            </a:r>
+          </a:p>
+          <a:p>
+            <a:r>
+              <a:rPr lang="pt-BR" dirty="0" smtClean="0"/>
+              <a:t>Defensores mais radicais do </a:t>
+            </a:r>
+            <a:r>
+              <a:rPr lang="pt-BR" dirty="0" err="1" smtClean="0"/>
+              <a:t>encapsulamento</a:t>
+            </a:r>
+            <a:r>
+              <a:rPr lang="pt-BR" dirty="0" smtClean="0"/>
+              <a:t> dizem que todos os </a:t>
+            </a:r>
+            <a:r>
+              <a:rPr lang="pt-BR" dirty="0" smtClean="0">
+                <a:solidFill>
+                  <a:srgbClr val="92D050"/>
+                </a:solidFill>
+              </a:rPr>
+              <a:t>atributos devem estar ocultos</a:t>
+            </a:r>
+          </a:p>
+          <a:p>
+            <a:r>
+              <a:rPr lang="pt-BR" dirty="0" smtClean="0"/>
+              <a:t>Para poder acessar cada atributo é necessário usar dois métodos, um </a:t>
+            </a:r>
+            <a:r>
+              <a:rPr lang="pt-BR" dirty="0" err="1" smtClean="0">
+                <a:solidFill>
+                  <a:srgbClr val="92D050"/>
+                </a:solidFill>
+              </a:rPr>
+              <a:t>get</a:t>
+            </a:r>
+            <a:r>
+              <a:rPr lang="pt-BR" dirty="0" smtClean="0"/>
+              <a:t> e outro </a:t>
+            </a:r>
+            <a:r>
+              <a:rPr lang="pt-BR" dirty="0" smtClean="0">
+                <a:solidFill>
+                  <a:srgbClr val="92D050"/>
+                </a:solidFill>
+              </a:rPr>
+              <a:t>set </a:t>
+            </a:r>
+            <a:endParaRPr lang="pt-BR" dirty="0">
+              <a:solidFill>
+                <a:srgbClr val="92D050"/>
+              </a:solidFill>
+            </a:endParaRPr>
+          </a:p>
+        </p:txBody>
+      </p:sp>
+    </p:spTree>
+  </p:cSld>
+  <p:clrMapOvr>
+    <a:masterClrMapping/>
+  </p:clrMapOvr>
+</p:sld>
+</file>
+
+<file path=ppt/slides/slide23.xml><?xml version="1.0" encoding="utf-8"?>
+<p:sld xmlns:a="http://schemas.openxmlformats.org/drawingml/2006/main" xmlns:r="http://schemas.openxmlformats.org/officeDocument/2006/relationships" xmlns:p="http://schemas.openxmlformats.org/presentationml/2006/main">
+  <p:cSld>
+    <p:spTree>
+      <p:nvGrpSpPr>
+        <p:cNvPr id="1" name=""/>
+        <p:cNvGrpSpPr/>
+        <p:nvPr/>
+      </p:nvGrpSpPr>
+      <p:grpSpPr>
+        <a:xfrm>
+          <a:off x="0" y="0"/>
+          <a:ext cx="0" cy="0"/>
+          <a:chOff x="0" y="0"/>
+          <a:chExt cx="0" cy="0"/>
+        </a:xfrm>
+      </p:grpSpPr>
+      <p:sp>
+        <p:nvSpPr>
+          <p:cNvPr id="2" name="Título 1"/>
+          <p:cNvSpPr>
+            <a:spLocks noGrp="1"/>
+          </p:cNvSpPr>
+          <p:nvPr>
+            <p:ph type="title"/>
+          </p:nvPr>
+        </p:nvSpPr>
+        <p:spPr/>
+        <p:txBody>
+          <a:bodyPr/>
+          <a:lstStyle/>
+          <a:p>
+            <a:r>
+              <a:rPr lang="pt-BR" dirty="0" err="1" smtClean="0"/>
+              <a:t>Encapsulamento</a:t>
+            </a:r>
+            <a:endParaRPr lang="pt-BR" dirty="0"/>
+          </a:p>
+        </p:txBody>
+      </p:sp>
+      <p:sp>
+        <p:nvSpPr>
+          <p:cNvPr id="3" name="Espaço Reservado para Conteúdo 2"/>
+          <p:cNvSpPr>
+            <a:spLocks noGrp="1"/>
+          </p:cNvSpPr>
+          <p:nvPr>
+            <p:ph idx="1"/>
+          </p:nvPr>
+        </p:nvSpPr>
+        <p:spPr/>
+        <p:txBody>
+          <a:bodyPr/>
+          <a:lstStyle/>
+          <a:p>
+            <a:r>
+              <a:rPr lang="pt-BR" dirty="0" smtClean="0"/>
+              <a:t>Veja abaixo um exemplo de diagrama de classe</a:t>
+            </a:r>
+            <a:endParaRPr lang="pt-BR" dirty="0"/>
+          </a:p>
+        </p:txBody>
+      </p:sp>
+      <p:pic>
+        <p:nvPicPr>
+          <p:cNvPr id="1026" name="Picture 2"/>
+          <p:cNvPicPr>
+            <a:picLocks noChangeAspect="1" noChangeArrowheads="1"/>
+          </p:cNvPicPr>
+          <p:nvPr/>
+        </p:nvPicPr>
+        <p:blipFill>
+          <a:blip r:embed="rId2"/>
+          <a:srcRect/>
+          <a:stretch>
+            <a:fillRect/>
+          </a:stretch>
+        </p:blipFill>
+        <p:spPr bwMode="auto">
+          <a:xfrm>
+            <a:off x="2714612" y="2928934"/>
+            <a:ext cx="3071834" cy="3470342"/>
+          </a:xfrm>
+          <a:prstGeom prst="rect">
+            <a:avLst/>
+          </a:prstGeom>
+          <a:noFill/>
+          <a:ln w="9525">
+            <a:noFill/>
+            <a:miter lim="800000"/>
+            <a:headEnd/>
+            <a:tailEnd/>
+          </a:ln>
+          <a:effectLst/>
+        </p:spPr>
+      </p:pic>
+    </p:spTree>
+  </p:cSld>
+  <p:clrMapOvr>
+    <a:masterClrMapping/>
+  </p:clrMapOvr>
 </p:sld>
 </file>
 
@@ -4887,6 +5920,12 @@
             <a:r>
               <a:rPr lang="pt-BR" dirty="0" smtClean="0"/>
               <a:t>Classe Abstrata</a:t>
+            </a:r>
+          </a:p>
+          <a:p>
+            <a:r>
+              <a:rPr lang="pt-BR" dirty="0" smtClean="0"/>
+              <a:t>Classes em Arquivos Separados</a:t>
             </a:r>
             <a:endParaRPr lang="pt-BR" dirty="0"/>
           </a:p>

</xml_diff>

<commit_message>
Videos M1 C2 P1 e M2 C1 P3
</commit_message>
<xml_diff>
--- a/curso/modulo2capitulo1.pptx
+++ b/curso/modulo2capitulo1.pptx
@@ -28,6 +28,13 @@
     <p:sldId id="277" r:id="rId22"/>
     <p:sldId id="278" r:id="rId23"/>
     <p:sldId id="279" r:id="rId24"/>
+    <p:sldId id="280" r:id="rId25"/>
+    <p:sldId id="281" r:id="rId26"/>
+    <p:sldId id="282" r:id="rId27"/>
+    <p:sldId id="283" r:id="rId28"/>
+    <p:sldId id="284" r:id="rId29"/>
+    <p:sldId id="285" r:id="rId30"/>
+    <p:sldId id="286" r:id="rId31"/>
   </p:sldIdLst>
   <p:sldSz cx="9144000" cy="6858000" type="screen4x3"/>
   <p:notesSz cx="6858000" cy="9144000"/>
@@ -514,7 +521,7 @@
             <a:fld id="{DC997751-B773-4FFE-B439-10C23787B14F}" type="datetimeFigureOut">
               <a:rPr lang="pt-BR" smtClean="0"/>
               <a:pPr/>
-              <a:t>4/7/2015</a:t>
+              <a:t>11/7/2015</a:t>
             </a:fld>
             <a:endParaRPr lang="pt-BR"/>
           </a:p>
@@ -681,7 +688,7 @@
             <a:fld id="{DC997751-B773-4FFE-B439-10C23787B14F}" type="datetimeFigureOut">
               <a:rPr lang="pt-BR" smtClean="0"/>
               <a:pPr/>
-              <a:t>4/7/2015</a:t>
+              <a:t>11/7/2015</a:t>
             </a:fld>
             <a:endParaRPr lang="pt-BR"/>
           </a:p>
@@ -858,7 +865,7 @@
             <a:fld id="{DC997751-B773-4FFE-B439-10C23787B14F}" type="datetimeFigureOut">
               <a:rPr lang="pt-BR" smtClean="0"/>
               <a:pPr/>
-              <a:t>4/7/2015</a:t>
+              <a:t>11/7/2015</a:t>
             </a:fld>
             <a:endParaRPr lang="pt-BR"/>
           </a:p>
@@ -1029,7 +1036,7 @@
             <a:fld id="{DC997751-B773-4FFE-B439-10C23787B14F}" type="datetimeFigureOut">
               <a:rPr lang="pt-BR" smtClean="0"/>
               <a:pPr/>
-              <a:t>4/7/2015</a:t>
+              <a:t>11/7/2015</a:t>
             </a:fld>
             <a:endParaRPr lang="pt-BR"/>
           </a:p>
@@ -1486,7 +1493,7 @@
             <a:fld id="{DC997751-B773-4FFE-B439-10C23787B14F}" type="datetimeFigureOut">
               <a:rPr lang="pt-BR" smtClean="0"/>
               <a:pPr/>
-              <a:t>4/7/2015</a:t>
+              <a:t>11/7/2015</a:t>
             </a:fld>
             <a:endParaRPr lang="pt-BR"/>
           </a:p>
@@ -1752,7 +1759,7 @@
             <a:fld id="{DC997751-B773-4FFE-B439-10C23787B14F}" type="datetimeFigureOut">
               <a:rPr lang="pt-BR" smtClean="0"/>
               <a:pPr/>
-              <a:t>4/7/2015</a:t>
+              <a:t>11/7/2015</a:t>
             </a:fld>
             <a:endParaRPr lang="pt-BR"/>
           </a:p>
@@ -2128,7 +2135,7 @@
             <a:fld id="{DC997751-B773-4FFE-B439-10C23787B14F}" type="datetimeFigureOut">
               <a:rPr lang="pt-BR" smtClean="0"/>
               <a:pPr/>
-              <a:t>4/7/2015</a:t>
+              <a:t>11/7/2015</a:t>
             </a:fld>
             <a:endParaRPr lang="pt-BR"/>
           </a:p>
@@ -2252,7 +2259,7 @@
             <a:fld id="{DC997751-B773-4FFE-B439-10C23787B14F}" type="datetimeFigureOut">
               <a:rPr lang="pt-BR" smtClean="0"/>
               <a:pPr/>
-              <a:t>4/7/2015</a:t>
+              <a:t>11/7/2015</a:t>
             </a:fld>
             <a:endParaRPr lang="pt-BR"/>
           </a:p>
@@ -2344,7 +2351,7 @@
             <a:fld id="{DC997751-B773-4FFE-B439-10C23787B14F}" type="datetimeFigureOut">
               <a:rPr lang="pt-BR" smtClean="0"/>
               <a:pPr/>
-              <a:t>4/7/2015</a:t>
+              <a:t>11/7/2015</a:t>
             </a:fld>
             <a:endParaRPr lang="pt-BR"/>
           </a:p>
@@ -2595,7 +2602,7 @@
             <a:fld id="{DC997751-B773-4FFE-B439-10C23787B14F}" type="datetimeFigureOut">
               <a:rPr lang="pt-BR" smtClean="0"/>
               <a:pPr/>
-              <a:t>4/7/2015</a:t>
+              <a:t>11/7/2015</a:t>
             </a:fld>
             <a:endParaRPr lang="pt-BR"/>
           </a:p>
@@ -2856,7 +2863,7 @@
             <a:fld id="{DC997751-B773-4FFE-B439-10C23787B14F}" type="datetimeFigureOut">
               <a:rPr lang="pt-BR" smtClean="0"/>
               <a:pPr/>
-              <a:t>4/7/2015</a:t>
+              <a:t>11/7/2015</a:t>
             </a:fld>
             <a:endParaRPr lang="pt-BR"/>
           </a:p>
@@ -3262,7 +3269,7 @@
             <a:fld id="{DC997751-B773-4FFE-B439-10C23787B14F}" type="datetimeFigureOut">
               <a:rPr lang="pt-BR" smtClean="0"/>
               <a:pPr/>
-              <a:t>4/7/2015</a:t>
+              <a:t>11/7/2015</a:t>
             </a:fld>
             <a:endParaRPr lang="pt-BR"/>
           </a:p>
@@ -4522,11 +4529,7 @@
             </a:r>
             <a:r>
               <a:rPr lang="pt-BR" dirty="0" smtClean="0"/>
-              <a:t>, até mesmo instâncias de outras classes</a:t>
-            </a:r>
-            <a:r>
-              <a:rPr lang="pt-BR" dirty="0" smtClean="0"/>
-              <a:t>!</a:t>
+              <a:t>, até mesmo instâncias de outras classes!</a:t>
             </a:r>
           </a:p>
           <a:p>
@@ -4775,31 +4778,7 @@
                   <a:srgbClr val="92D050"/>
                 </a:solidFill>
               </a:rPr>
-              <a:t>m</a:t>
-            </a:r>
-            <a:r>
-              <a:rPr lang="pt-BR" dirty="0" smtClean="0">
-                <a:solidFill>
-                  <a:srgbClr val="92D050"/>
-                </a:solidFill>
-              </a:rPr>
-              <a:t>étodo </a:t>
-            </a:r>
-            <a:r>
-              <a:rPr lang="pt-BR" dirty="0" smtClean="0">
-                <a:solidFill>
-                  <a:srgbClr val="92D050"/>
-                </a:solidFill>
-              </a:rPr>
-              <a:t>c</a:t>
-            </a:r>
-            <a:r>
-              <a:rPr lang="pt-BR" dirty="0" smtClean="0">
-                <a:solidFill>
-                  <a:srgbClr val="92D050"/>
-                </a:solidFill>
-              </a:rPr>
-              <a:t>onstrutor</a:t>
+              <a:t>método construtor</a:t>
             </a:r>
             <a:r>
               <a:rPr lang="pt-BR" dirty="0" smtClean="0"/>
@@ -4924,7 +4903,19 @@
                   <a:srgbClr val="92D050"/>
                 </a:solidFill>
               </a:rPr>
-              <a:t>inicialização de </a:t>
+              <a:t>inicialização de atributos</a:t>
+            </a:r>
+          </a:p>
+          <a:p>
+            <a:r>
+              <a:rPr lang="pt-BR" dirty="0" smtClean="0"/>
+              <a:t>O método construtor pode receber parâmetros, e estes deverão ser passados no momento da inicialização</a:t>
+            </a:r>
+          </a:p>
+          <a:p>
+            <a:r>
+              <a:rPr lang="pt-BR" dirty="0" smtClean="0"/>
+              <a:t>Construtor é um método, e por isso pode ser </a:t>
             </a:r>
             <a:r>
               <a:rPr lang="pt-BR" dirty="0" smtClean="0">
@@ -4932,55 +4923,26 @@
                   <a:srgbClr val="92D050"/>
                 </a:solidFill>
               </a:rPr>
-              <a:t>atributos</a:t>
-            </a:r>
-          </a:p>
-          <a:p>
-            <a:r>
-              <a:rPr lang="pt-BR" dirty="0" smtClean="0"/>
-              <a:t>O </a:t>
-            </a:r>
-            <a:r>
-              <a:rPr lang="pt-BR" dirty="0" smtClean="0"/>
-              <a:t>método construtor pode receber parâmetros, e estes deverão ser passados no momento da </a:t>
-            </a:r>
-            <a:r>
-              <a:rPr lang="pt-BR" dirty="0" smtClean="0"/>
-              <a:t>inicialização</a:t>
-            </a:r>
-          </a:p>
-          <a:p>
-            <a:r>
-              <a:rPr lang="pt-BR" dirty="0" smtClean="0"/>
-              <a:t>Construtor é um método, e por isso pode ser </a:t>
-            </a:r>
+              <a:t>sobrecarregado</a:t>
+            </a:r>
+            <a:r>
+              <a:rPr lang="pt-BR" dirty="0" smtClean="0"/>
+              <a:t> também</a:t>
+            </a:r>
+          </a:p>
+          <a:p>
             <a:r>
               <a:rPr lang="pt-BR" dirty="0" smtClean="0">
                 <a:solidFill>
                   <a:srgbClr val="92D050"/>
                 </a:solidFill>
               </a:rPr>
-              <a:t>sobrecarregado</a:t>
-            </a:r>
-            <a:r>
-              <a:rPr lang="pt-BR" dirty="0" smtClean="0"/>
-              <a:t> também</a:t>
-            </a:r>
-          </a:p>
-          <a:p>
-            <a:r>
-              <a:rPr lang="pt-BR" dirty="0" smtClean="0">
-                <a:solidFill>
-                  <a:srgbClr val="92D050"/>
-                </a:solidFill>
-              </a:rPr>
               <a:t>Encadeamento de construtores</a:t>
             </a:r>
             <a:r>
               <a:rPr lang="pt-BR" dirty="0" smtClean="0"/>
               <a:t> permite chamar um construtor (sobrecarga) a partir de outro construtor</a:t>
             </a:r>
-            <a:endParaRPr lang="pt-BR" dirty="0" smtClean="0"/>
           </a:p>
           <a:p>
             <a:endParaRPr lang="pt-BR" dirty="0"/>
@@ -5844,6 +5806,931 @@
 </p:sld>
 </file>
 
+<file path=ppt/slides/slide24.xml><?xml version="1.0" encoding="utf-8"?>
+<p:sld xmlns:a="http://schemas.openxmlformats.org/drawingml/2006/main" xmlns:r="http://schemas.openxmlformats.org/officeDocument/2006/relationships" xmlns:p="http://schemas.openxmlformats.org/presentationml/2006/main">
+  <p:cSld>
+    <p:spTree>
+      <p:nvGrpSpPr>
+        <p:cNvPr id="1" name=""/>
+        <p:cNvGrpSpPr/>
+        <p:nvPr/>
+      </p:nvGrpSpPr>
+      <p:grpSpPr>
+        <a:xfrm>
+          <a:off x="0" y="0"/>
+          <a:ext cx="0" cy="0"/>
+          <a:chOff x="0" y="0"/>
+          <a:chExt cx="0" cy="0"/>
+        </a:xfrm>
+      </p:grpSpPr>
+      <p:sp>
+        <p:nvSpPr>
+          <p:cNvPr id="2" name="Título 1"/>
+          <p:cNvSpPr>
+            <a:spLocks noGrp="1"/>
+          </p:cNvSpPr>
+          <p:nvPr>
+            <p:ph type="title"/>
+          </p:nvPr>
+        </p:nvSpPr>
+        <p:spPr/>
+        <p:txBody>
+          <a:bodyPr/>
+          <a:lstStyle/>
+          <a:p>
+            <a:r>
+              <a:rPr lang="pt-BR" dirty="0" smtClean="0"/>
+              <a:t>Propriedades</a:t>
+            </a:r>
+            <a:endParaRPr lang="pt-BR" dirty="0"/>
+          </a:p>
+        </p:txBody>
+      </p:sp>
+      <p:sp>
+        <p:nvSpPr>
+          <p:cNvPr id="3" name="Espaço Reservado para Conteúdo 2"/>
+          <p:cNvSpPr>
+            <a:spLocks noGrp="1"/>
+          </p:cNvSpPr>
+          <p:nvPr>
+            <p:ph idx="1"/>
+          </p:nvPr>
+        </p:nvSpPr>
+        <p:spPr/>
+        <p:txBody>
+          <a:bodyPr>
+            <a:normAutofit lnSpcReduction="10000"/>
+          </a:bodyPr>
+          <a:lstStyle/>
+          <a:p>
+            <a:r>
+              <a:rPr lang="pt-BR" dirty="0" smtClean="0"/>
+              <a:t>O </a:t>
+            </a:r>
+            <a:r>
+              <a:rPr lang="pt-BR" dirty="0" err="1" smtClean="0"/>
+              <a:t>encapsulamento</a:t>
+            </a:r>
+            <a:r>
+              <a:rPr lang="pt-BR" dirty="0" smtClean="0"/>
+              <a:t> puro prega que </a:t>
+            </a:r>
+            <a:r>
+              <a:rPr lang="pt-BR" dirty="0" smtClean="0">
+                <a:solidFill>
+                  <a:srgbClr val="92D050"/>
+                </a:solidFill>
+              </a:rPr>
+              <a:t>todos os atributos devem ser privados</a:t>
+            </a:r>
+          </a:p>
+          <a:p>
+            <a:r>
+              <a:rPr lang="pt-BR" dirty="0" smtClean="0"/>
+              <a:t>Isso garante a </a:t>
+            </a:r>
+            <a:r>
+              <a:rPr lang="pt-BR" dirty="0" smtClean="0">
+                <a:solidFill>
+                  <a:srgbClr val="92D050"/>
+                </a:solidFill>
+              </a:rPr>
+              <a:t>segurança</a:t>
+            </a:r>
+            <a:r>
+              <a:rPr lang="pt-BR" dirty="0" smtClean="0"/>
+              <a:t> dos atributos do objeto, pois obriga o programador a </a:t>
+            </a:r>
+            <a:r>
+              <a:rPr lang="pt-BR" dirty="0" smtClean="0">
+                <a:solidFill>
+                  <a:srgbClr val="92D050"/>
+                </a:solidFill>
+              </a:rPr>
+              <a:t>criar métodos</a:t>
+            </a:r>
+            <a:r>
+              <a:rPr lang="pt-BR" dirty="0" smtClean="0"/>
+              <a:t> para outras classes acessarem os atributos</a:t>
+            </a:r>
+          </a:p>
+          <a:p>
+            <a:r>
+              <a:rPr lang="pt-BR" dirty="0" smtClean="0"/>
+              <a:t>Os métodos são normalmente chamados de:</a:t>
+            </a:r>
+          </a:p>
+          <a:p>
+            <a:pPr lvl="1"/>
+            <a:r>
+              <a:rPr lang="pt-BR" dirty="0" err="1" smtClean="0">
+                <a:solidFill>
+                  <a:srgbClr val="92D050"/>
+                </a:solidFill>
+              </a:rPr>
+              <a:t>GetXYZ</a:t>
+            </a:r>
+            <a:r>
+              <a:rPr lang="pt-BR" dirty="0" smtClean="0"/>
+              <a:t>, para </a:t>
+            </a:r>
+            <a:r>
+              <a:rPr lang="pt-BR" dirty="0" smtClean="0">
+                <a:solidFill>
+                  <a:srgbClr val="92D050"/>
+                </a:solidFill>
+              </a:rPr>
+              <a:t>ler</a:t>
+            </a:r>
+            <a:r>
+              <a:rPr lang="pt-BR" dirty="0" smtClean="0"/>
+              <a:t> o atributo XYZ</a:t>
+            </a:r>
+          </a:p>
+          <a:p>
+            <a:pPr lvl="1"/>
+            <a:r>
+              <a:rPr lang="pt-BR" dirty="0" err="1" smtClean="0">
+                <a:solidFill>
+                  <a:srgbClr val="92D050"/>
+                </a:solidFill>
+              </a:rPr>
+              <a:t>SetXYZ</a:t>
+            </a:r>
+            <a:r>
+              <a:rPr lang="pt-BR" dirty="0" smtClean="0"/>
+              <a:t>, para </a:t>
+            </a:r>
+            <a:r>
+              <a:rPr lang="pt-BR" dirty="0" smtClean="0">
+                <a:solidFill>
+                  <a:srgbClr val="92D050"/>
+                </a:solidFill>
+              </a:rPr>
+              <a:t>escrever</a:t>
+            </a:r>
+            <a:r>
+              <a:rPr lang="pt-BR" dirty="0" smtClean="0"/>
+              <a:t> no atributo XYZ</a:t>
+            </a:r>
+            <a:endParaRPr lang="pt-BR" dirty="0"/>
+          </a:p>
+        </p:txBody>
+      </p:sp>
+    </p:spTree>
+  </p:cSld>
+  <p:clrMapOvr>
+    <a:masterClrMapping/>
+  </p:clrMapOvr>
+</p:sld>
+</file>
+
+<file path=ppt/slides/slide25.xml><?xml version="1.0" encoding="utf-8"?>
+<p:sld xmlns:a="http://schemas.openxmlformats.org/drawingml/2006/main" xmlns:r="http://schemas.openxmlformats.org/officeDocument/2006/relationships" xmlns:p="http://schemas.openxmlformats.org/presentationml/2006/main">
+  <p:cSld>
+    <p:spTree>
+      <p:nvGrpSpPr>
+        <p:cNvPr id="1" name=""/>
+        <p:cNvGrpSpPr/>
+        <p:nvPr/>
+      </p:nvGrpSpPr>
+      <p:grpSpPr>
+        <a:xfrm>
+          <a:off x="0" y="0"/>
+          <a:ext cx="0" cy="0"/>
+          <a:chOff x="0" y="0"/>
+          <a:chExt cx="0" cy="0"/>
+        </a:xfrm>
+      </p:grpSpPr>
+      <p:sp>
+        <p:nvSpPr>
+          <p:cNvPr id="2" name="Título 1"/>
+          <p:cNvSpPr>
+            <a:spLocks noGrp="1"/>
+          </p:cNvSpPr>
+          <p:nvPr>
+            <p:ph type="title"/>
+          </p:nvPr>
+        </p:nvSpPr>
+        <p:spPr/>
+        <p:txBody>
+          <a:bodyPr/>
+          <a:lstStyle/>
+          <a:p>
+            <a:r>
+              <a:rPr lang="pt-BR" dirty="0" smtClean="0"/>
+              <a:t>Propriedades</a:t>
+            </a:r>
+            <a:endParaRPr lang="pt-BR" dirty="0"/>
+          </a:p>
+        </p:txBody>
+      </p:sp>
+      <p:sp>
+        <p:nvSpPr>
+          <p:cNvPr id="3" name="Espaço Reservado para Conteúdo 2"/>
+          <p:cNvSpPr>
+            <a:spLocks noGrp="1"/>
+          </p:cNvSpPr>
+          <p:nvPr>
+            <p:ph idx="1"/>
+          </p:nvPr>
+        </p:nvSpPr>
+        <p:spPr/>
+        <p:txBody>
+          <a:bodyPr>
+            <a:normAutofit lnSpcReduction="10000"/>
+          </a:bodyPr>
+          <a:lstStyle/>
+          <a:p>
+            <a:r>
+              <a:rPr lang="pt-BR" dirty="0" smtClean="0"/>
+              <a:t>Com isso podemos dar permissão de leitura a um atributo, mas não de escrita</a:t>
+            </a:r>
+          </a:p>
+          <a:p>
+            <a:r>
+              <a:rPr lang="pt-BR" dirty="0" smtClean="0">
+                <a:solidFill>
+                  <a:srgbClr val="92D050"/>
+                </a:solidFill>
+              </a:rPr>
+              <a:t>Propriedades</a:t>
+            </a:r>
+            <a:r>
+              <a:rPr lang="pt-BR" dirty="0" smtClean="0"/>
+              <a:t> são membros especiais de uma classe que evitam esses métodos </a:t>
+            </a:r>
+            <a:r>
+              <a:rPr lang="pt-BR" dirty="0" err="1" smtClean="0">
+                <a:solidFill>
+                  <a:srgbClr val="92D050"/>
+                </a:solidFill>
+              </a:rPr>
+              <a:t>GetXYZ</a:t>
+            </a:r>
+            <a:r>
+              <a:rPr lang="pt-BR" dirty="0" smtClean="0"/>
+              <a:t> e </a:t>
+            </a:r>
+            <a:r>
+              <a:rPr lang="pt-BR" dirty="0" err="1" smtClean="0">
+                <a:solidFill>
+                  <a:srgbClr val="92D050"/>
+                </a:solidFill>
+              </a:rPr>
+              <a:t>SetXYZ</a:t>
+            </a:r>
+            <a:r>
+              <a:rPr lang="pt-BR" dirty="0" smtClean="0"/>
+              <a:t> repetitivos</a:t>
+            </a:r>
+          </a:p>
+          <a:p>
+            <a:r>
+              <a:rPr lang="pt-BR" dirty="0" smtClean="0"/>
+              <a:t>Propriedades são </a:t>
+            </a:r>
+            <a:r>
+              <a:rPr lang="pt-BR" dirty="0" smtClean="0">
+                <a:solidFill>
+                  <a:srgbClr val="92D050"/>
+                </a:solidFill>
+              </a:rPr>
+              <a:t>usadas</a:t>
+            </a:r>
+            <a:r>
+              <a:rPr lang="pt-BR" dirty="0" smtClean="0"/>
+              <a:t> como se fossem </a:t>
+            </a:r>
+            <a:r>
+              <a:rPr lang="pt-BR" dirty="0" smtClean="0">
+                <a:solidFill>
+                  <a:srgbClr val="92D050"/>
+                </a:solidFill>
+              </a:rPr>
+              <a:t>atributos</a:t>
+            </a:r>
+            <a:r>
+              <a:rPr lang="pt-BR" dirty="0" smtClean="0"/>
+              <a:t>, e </a:t>
+            </a:r>
+            <a:r>
+              <a:rPr lang="pt-BR" dirty="0" smtClean="0">
+                <a:solidFill>
+                  <a:srgbClr val="92D050"/>
+                </a:solidFill>
+              </a:rPr>
+              <a:t>declaradas</a:t>
+            </a:r>
+            <a:r>
+              <a:rPr lang="pt-BR" dirty="0" smtClean="0"/>
+              <a:t> como se fossem </a:t>
+            </a:r>
+            <a:r>
+              <a:rPr lang="pt-BR" dirty="0" smtClean="0">
+                <a:solidFill>
+                  <a:srgbClr val="92D050"/>
+                </a:solidFill>
+              </a:rPr>
+              <a:t>métodos</a:t>
+            </a:r>
+          </a:p>
+          <a:p>
+            <a:r>
+              <a:rPr lang="pt-BR" dirty="0" smtClean="0"/>
+              <a:t>Usa-se as palavras reservadas </a:t>
+            </a:r>
+            <a:r>
+              <a:rPr lang="pt-BR" dirty="0" err="1" smtClean="0">
+                <a:solidFill>
+                  <a:srgbClr val="92D050"/>
+                </a:solidFill>
+              </a:rPr>
+              <a:t>get</a:t>
+            </a:r>
+            <a:r>
+              <a:rPr lang="pt-BR" dirty="0" smtClean="0"/>
+              <a:t>, </a:t>
+            </a:r>
+            <a:r>
+              <a:rPr lang="pt-BR" dirty="0" smtClean="0">
+                <a:solidFill>
+                  <a:srgbClr val="92D050"/>
+                </a:solidFill>
+              </a:rPr>
+              <a:t>set</a:t>
+            </a:r>
+            <a:r>
+              <a:rPr lang="pt-BR" dirty="0" smtClean="0"/>
+              <a:t> e </a:t>
+            </a:r>
+            <a:r>
+              <a:rPr lang="pt-BR" dirty="0" err="1" smtClean="0">
+                <a:solidFill>
+                  <a:srgbClr val="92D050"/>
+                </a:solidFill>
+              </a:rPr>
+              <a:t>value</a:t>
+            </a:r>
+            <a:endParaRPr lang="pt-BR" dirty="0">
+              <a:solidFill>
+                <a:srgbClr val="92D050"/>
+              </a:solidFill>
+            </a:endParaRPr>
+          </a:p>
+        </p:txBody>
+      </p:sp>
+    </p:spTree>
+  </p:cSld>
+  <p:clrMapOvr>
+    <a:masterClrMapping/>
+  </p:clrMapOvr>
+</p:sld>
+</file>
+
+<file path=ppt/slides/slide26.xml><?xml version="1.0" encoding="utf-8"?>
+<p:sld xmlns:a="http://schemas.openxmlformats.org/drawingml/2006/main" xmlns:r="http://schemas.openxmlformats.org/officeDocument/2006/relationships" xmlns:p="http://schemas.openxmlformats.org/presentationml/2006/main">
+  <p:cSld>
+    <p:spTree>
+      <p:nvGrpSpPr>
+        <p:cNvPr id="1" name=""/>
+        <p:cNvGrpSpPr/>
+        <p:nvPr/>
+      </p:nvGrpSpPr>
+      <p:grpSpPr>
+        <a:xfrm>
+          <a:off x="0" y="0"/>
+          <a:ext cx="0" cy="0"/>
+          <a:chOff x="0" y="0"/>
+          <a:chExt cx="0" cy="0"/>
+        </a:xfrm>
+      </p:grpSpPr>
+      <p:sp>
+        <p:nvSpPr>
+          <p:cNvPr id="2" name="Título 1"/>
+          <p:cNvSpPr>
+            <a:spLocks noGrp="1"/>
+          </p:cNvSpPr>
+          <p:nvPr>
+            <p:ph type="title"/>
+          </p:nvPr>
+        </p:nvSpPr>
+        <p:spPr/>
+        <p:txBody>
+          <a:bodyPr/>
+          <a:lstStyle/>
+          <a:p>
+            <a:r>
+              <a:rPr lang="pt-BR" dirty="0" smtClean="0"/>
+              <a:t>Propriedades</a:t>
+            </a:r>
+            <a:endParaRPr lang="pt-BR" dirty="0"/>
+          </a:p>
+        </p:txBody>
+      </p:sp>
+      <p:sp>
+        <p:nvSpPr>
+          <p:cNvPr id="3" name="Espaço Reservado para Conteúdo 2"/>
+          <p:cNvSpPr>
+            <a:spLocks noGrp="1"/>
+          </p:cNvSpPr>
+          <p:nvPr>
+            <p:ph idx="1"/>
+          </p:nvPr>
+        </p:nvSpPr>
+        <p:spPr/>
+        <p:txBody>
+          <a:bodyPr>
+            <a:normAutofit/>
+          </a:bodyPr>
+          <a:lstStyle/>
+          <a:p>
+            <a:r>
+              <a:rPr lang="pt-BR" dirty="0" smtClean="0"/>
+              <a:t>Dessa forma, pode ser feito um </a:t>
+            </a:r>
+            <a:r>
+              <a:rPr lang="pt-BR" dirty="0" smtClean="0">
+                <a:solidFill>
+                  <a:srgbClr val="92D050"/>
+                </a:solidFill>
+              </a:rPr>
+              <a:t>cálculo ou processamento </a:t>
+            </a:r>
+            <a:r>
+              <a:rPr lang="pt-BR" dirty="0" smtClean="0"/>
+              <a:t>na leitura e na escrita de atributos</a:t>
+            </a:r>
+          </a:p>
+          <a:p>
+            <a:r>
+              <a:rPr lang="pt-BR" dirty="0" smtClean="0"/>
+              <a:t>Propriedades garantem a </a:t>
+            </a:r>
+            <a:r>
+              <a:rPr lang="pt-BR" dirty="0" smtClean="0">
+                <a:solidFill>
+                  <a:srgbClr val="92D050"/>
+                </a:solidFill>
+              </a:rPr>
+              <a:t>segurança e a consistência</a:t>
+            </a:r>
+            <a:r>
+              <a:rPr lang="pt-BR" dirty="0" smtClean="0"/>
+              <a:t> dos atributos de uma classe</a:t>
+            </a:r>
+            <a:endParaRPr lang="pt-BR" dirty="0" smtClean="0"/>
+          </a:p>
+          <a:p>
+            <a:r>
+              <a:rPr lang="pt-BR" dirty="0" smtClean="0"/>
+              <a:t>Mesmo assim, mantém fácil acesso aos atributos, como se eles fossem variáveis públicas normais</a:t>
+            </a:r>
+          </a:p>
+        </p:txBody>
+      </p:sp>
+    </p:spTree>
+  </p:cSld>
+  <p:clrMapOvr>
+    <a:masterClrMapping/>
+  </p:clrMapOvr>
+</p:sld>
+</file>
+
+<file path=ppt/slides/slide27.xml><?xml version="1.0" encoding="utf-8"?>
+<p:sld xmlns:a="http://schemas.openxmlformats.org/drawingml/2006/main" xmlns:r="http://schemas.openxmlformats.org/officeDocument/2006/relationships" xmlns:p="http://schemas.openxmlformats.org/presentationml/2006/main">
+  <p:cSld>
+    <p:spTree>
+      <p:nvGrpSpPr>
+        <p:cNvPr id="1" name=""/>
+        <p:cNvGrpSpPr/>
+        <p:nvPr/>
+      </p:nvGrpSpPr>
+      <p:grpSpPr>
+        <a:xfrm>
+          <a:off x="0" y="0"/>
+          <a:ext cx="0" cy="0"/>
+          <a:chOff x="0" y="0"/>
+          <a:chExt cx="0" cy="0"/>
+        </a:xfrm>
+      </p:grpSpPr>
+      <p:sp>
+        <p:nvSpPr>
+          <p:cNvPr id="2" name="Título 1"/>
+          <p:cNvSpPr>
+            <a:spLocks noGrp="1"/>
+          </p:cNvSpPr>
+          <p:nvPr>
+            <p:ph type="title"/>
+          </p:nvPr>
+        </p:nvSpPr>
+        <p:spPr/>
+        <p:txBody>
+          <a:bodyPr/>
+          <a:lstStyle/>
+          <a:p>
+            <a:r>
+              <a:rPr lang="pt-BR" dirty="0" smtClean="0"/>
+              <a:t>Herança</a:t>
+            </a:r>
+            <a:endParaRPr lang="pt-BR" dirty="0"/>
+          </a:p>
+        </p:txBody>
+      </p:sp>
+      <p:sp>
+        <p:nvSpPr>
+          <p:cNvPr id="3" name="Espaço Reservado para Conteúdo 2"/>
+          <p:cNvSpPr>
+            <a:spLocks noGrp="1"/>
+          </p:cNvSpPr>
+          <p:nvPr>
+            <p:ph idx="1"/>
+          </p:nvPr>
+        </p:nvSpPr>
+        <p:spPr/>
+        <p:txBody>
+          <a:bodyPr/>
+          <a:lstStyle/>
+          <a:p>
+            <a:r>
+              <a:rPr lang="pt-BR" dirty="0" smtClean="0"/>
+              <a:t>Uma das coisas mais importantes que um programador precisa ter em mente é a </a:t>
+            </a:r>
+            <a:r>
+              <a:rPr lang="pt-BR" dirty="0" smtClean="0">
+                <a:solidFill>
+                  <a:srgbClr val="92D050"/>
+                </a:solidFill>
+              </a:rPr>
+              <a:t>reutilização de código</a:t>
+            </a:r>
+          </a:p>
+          <a:p>
+            <a:r>
+              <a:rPr lang="pt-BR" dirty="0" smtClean="0">
+                <a:solidFill>
+                  <a:srgbClr val="92D050"/>
+                </a:solidFill>
+              </a:rPr>
+              <a:t>Programação </a:t>
+            </a:r>
+            <a:r>
+              <a:rPr lang="pt-BR" dirty="0" err="1" smtClean="0">
+                <a:solidFill>
+                  <a:srgbClr val="92D050"/>
+                </a:solidFill>
+              </a:rPr>
+              <a:t>procedural</a:t>
+            </a:r>
+            <a:r>
+              <a:rPr lang="pt-BR" dirty="0" smtClean="0"/>
+              <a:t> permite a reutilização de funções e procedimentos</a:t>
+            </a:r>
+          </a:p>
+          <a:p>
+            <a:r>
+              <a:rPr lang="pt-BR" dirty="0" smtClean="0">
+                <a:solidFill>
+                  <a:srgbClr val="92D050"/>
+                </a:solidFill>
+              </a:rPr>
+              <a:t>Programação orientada a objetos </a:t>
+            </a:r>
+            <a:r>
+              <a:rPr lang="pt-BR" dirty="0" smtClean="0"/>
+              <a:t>permite a reutilização de classes, através de um mecanismo chamado </a:t>
+            </a:r>
+            <a:r>
+              <a:rPr lang="pt-BR" dirty="0" smtClean="0">
+                <a:solidFill>
+                  <a:srgbClr val="92D050"/>
+                </a:solidFill>
+              </a:rPr>
+              <a:t>herança</a:t>
+            </a:r>
+            <a:endParaRPr lang="pt-BR" dirty="0">
+              <a:solidFill>
+                <a:srgbClr val="92D050"/>
+              </a:solidFill>
+            </a:endParaRPr>
+          </a:p>
+        </p:txBody>
+      </p:sp>
+    </p:spTree>
+  </p:cSld>
+  <p:clrMapOvr>
+    <a:masterClrMapping/>
+  </p:clrMapOvr>
+</p:sld>
+</file>
+
+<file path=ppt/slides/slide28.xml><?xml version="1.0" encoding="utf-8"?>
+<p:sld xmlns:a="http://schemas.openxmlformats.org/drawingml/2006/main" xmlns:r="http://schemas.openxmlformats.org/officeDocument/2006/relationships" xmlns:p="http://schemas.openxmlformats.org/presentationml/2006/main">
+  <p:cSld>
+    <p:spTree>
+      <p:nvGrpSpPr>
+        <p:cNvPr id="1" name=""/>
+        <p:cNvGrpSpPr/>
+        <p:nvPr/>
+      </p:nvGrpSpPr>
+      <p:grpSpPr>
+        <a:xfrm>
+          <a:off x="0" y="0"/>
+          <a:ext cx="0" cy="0"/>
+          <a:chOff x="0" y="0"/>
+          <a:chExt cx="0" cy="0"/>
+        </a:xfrm>
+      </p:grpSpPr>
+      <p:sp>
+        <p:nvSpPr>
+          <p:cNvPr id="2" name="Título 1"/>
+          <p:cNvSpPr>
+            <a:spLocks noGrp="1"/>
+          </p:cNvSpPr>
+          <p:nvPr>
+            <p:ph type="title"/>
+          </p:nvPr>
+        </p:nvSpPr>
+        <p:spPr/>
+        <p:txBody>
+          <a:bodyPr/>
+          <a:lstStyle/>
+          <a:p>
+            <a:r>
+              <a:rPr lang="pt-BR" dirty="0" smtClean="0"/>
+              <a:t>Herança</a:t>
+            </a:r>
+            <a:endParaRPr lang="pt-BR" dirty="0"/>
+          </a:p>
+        </p:txBody>
+      </p:sp>
+      <p:sp>
+        <p:nvSpPr>
+          <p:cNvPr id="3" name="Espaço Reservado para Conteúdo 2"/>
+          <p:cNvSpPr>
+            <a:spLocks noGrp="1"/>
+          </p:cNvSpPr>
+          <p:nvPr>
+            <p:ph idx="1"/>
+          </p:nvPr>
+        </p:nvSpPr>
+        <p:spPr/>
+        <p:txBody>
+          <a:bodyPr/>
+          <a:lstStyle/>
+          <a:p>
+            <a:r>
+              <a:rPr lang="pt-BR" dirty="0" smtClean="0"/>
+              <a:t>Herança descreve um </a:t>
+            </a:r>
+            <a:r>
+              <a:rPr lang="pt-BR" dirty="0" smtClean="0">
+                <a:solidFill>
+                  <a:srgbClr val="92D050"/>
+                </a:solidFill>
+              </a:rPr>
+              <a:t>relacionamento</a:t>
+            </a:r>
+            <a:r>
+              <a:rPr lang="pt-BR" dirty="0" smtClean="0"/>
+              <a:t> entre classes</a:t>
+            </a:r>
+          </a:p>
+          <a:p>
+            <a:r>
+              <a:rPr lang="pt-BR" dirty="0" smtClean="0"/>
+              <a:t>Uma classe </a:t>
+            </a:r>
+            <a:r>
+              <a:rPr lang="pt-BR" dirty="0" smtClean="0">
+                <a:solidFill>
+                  <a:srgbClr val="92D050"/>
+                </a:solidFill>
+              </a:rPr>
+              <a:t>copia</a:t>
+            </a:r>
+            <a:r>
+              <a:rPr lang="pt-BR" dirty="0" smtClean="0"/>
+              <a:t> (ou </a:t>
+            </a:r>
+            <a:r>
+              <a:rPr lang="pt-BR" dirty="0" smtClean="0">
+                <a:solidFill>
+                  <a:srgbClr val="92D050"/>
+                </a:solidFill>
+              </a:rPr>
+              <a:t>herda</a:t>
+            </a:r>
+            <a:r>
+              <a:rPr lang="pt-BR" dirty="0" smtClean="0"/>
+              <a:t>) todas as propriedades, atributos e métodos de outra classe</a:t>
+            </a:r>
+          </a:p>
+          <a:p>
+            <a:r>
+              <a:rPr lang="pt-BR" dirty="0" smtClean="0"/>
+              <a:t>A </a:t>
+            </a:r>
+            <a:r>
+              <a:rPr lang="pt-BR" dirty="0" err="1" smtClean="0"/>
+              <a:t>ideia</a:t>
+            </a:r>
+            <a:r>
+              <a:rPr lang="pt-BR" dirty="0" smtClean="0"/>
+              <a:t> é </a:t>
+            </a:r>
+            <a:r>
+              <a:rPr lang="pt-BR" dirty="0" smtClean="0">
+                <a:solidFill>
+                  <a:srgbClr val="92D050"/>
+                </a:solidFill>
+              </a:rPr>
+              <a:t>estender a funcionalidade</a:t>
+            </a:r>
+          </a:p>
+          <a:p>
+            <a:r>
+              <a:rPr lang="pt-BR" dirty="0" smtClean="0"/>
+              <a:t>Herança define um relacionamento de:</a:t>
+            </a:r>
+          </a:p>
+          <a:p>
+            <a:pPr lvl="1"/>
+            <a:r>
+              <a:rPr lang="pt-BR" dirty="0" smtClean="0">
+                <a:solidFill>
+                  <a:srgbClr val="92D050"/>
+                </a:solidFill>
+              </a:rPr>
+              <a:t>Especialização</a:t>
+            </a:r>
+          </a:p>
+          <a:p>
+            <a:pPr lvl="1"/>
+            <a:r>
+              <a:rPr lang="pt-BR" dirty="0" smtClean="0">
+                <a:solidFill>
+                  <a:srgbClr val="92D050"/>
+                </a:solidFill>
+              </a:rPr>
+              <a:t>Generalização</a:t>
+            </a:r>
+          </a:p>
+        </p:txBody>
+      </p:sp>
+    </p:spTree>
+  </p:cSld>
+  <p:clrMapOvr>
+    <a:masterClrMapping/>
+  </p:clrMapOvr>
+</p:sld>
+</file>
+
+<file path=ppt/slides/slide29.xml><?xml version="1.0" encoding="utf-8"?>
+<p:sld xmlns:a="http://schemas.openxmlformats.org/drawingml/2006/main" xmlns:r="http://schemas.openxmlformats.org/officeDocument/2006/relationships" xmlns:p="http://schemas.openxmlformats.org/presentationml/2006/main">
+  <p:cSld>
+    <p:spTree>
+      <p:nvGrpSpPr>
+        <p:cNvPr id="1" name=""/>
+        <p:cNvGrpSpPr/>
+        <p:nvPr/>
+      </p:nvGrpSpPr>
+      <p:grpSpPr>
+        <a:xfrm>
+          <a:off x="0" y="0"/>
+          <a:ext cx="0" cy="0"/>
+          <a:chOff x="0" y="0"/>
+          <a:chExt cx="0" cy="0"/>
+        </a:xfrm>
+      </p:grpSpPr>
+      <p:sp>
+        <p:nvSpPr>
+          <p:cNvPr id="2" name="Título 1"/>
+          <p:cNvSpPr>
+            <a:spLocks noGrp="1"/>
+          </p:cNvSpPr>
+          <p:nvPr>
+            <p:ph type="title"/>
+          </p:nvPr>
+        </p:nvSpPr>
+        <p:spPr/>
+        <p:txBody>
+          <a:bodyPr/>
+          <a:lstStyle/>
+          <a:p>
+            <a:r>
+              <a:rPr lang="pt-BR" dirty="0" smtClean="0"/>
+              <a:t>Herança</a:t>
+            </a:r>
+            <a:endParaRPr lang="pt-BR" dirty="0"/>
+          </a:p>
+        </p:txBody>
+      </p:sp>
+      <p:sp>
+        <p:nvSpPr>
+          <p:cNvPr id="3" name="Espaço Reservado para Conteúdo 2"/>
+          <p:cNvSpPr>
+            <a:spLocks noGrp="1"/>
+          </p:cNvSpPr>
+          <p:nvPr>
+            <p:ph idx="1"/>
+          </p:nvPr>
+        </p:nvSpPr>
+        <p:spPr/>
+        <p:txBody>
+          <a:bodyPr>
+            <a:normAutofit lnSpcReduction="10000"/>
+          </a:bodyPr>
+          <a:lstStyle/>
+          <a:p>
+            <a:r>
+              <a:rPr lang="pt-BR" dirty="0" smtClean="0"/>
+              <a:t>A classe que </a:t>
+            </a:r>
+            <a:r>
+              <a:rPr lang="pt-BR" dirty="0" smtClean="0">
+                <a:solidFill>
+                  <a:srgbClr val="92D050"/>
+                </a:solidFill>
+              </a:rPr>
+              <a:t>cede</a:t>
+            </a:r>
+            <a:r>
+              <a:rPr lang="pt-BR" dirty="0" smtClean="0"/>
+              <a:t> os membros é chamada de:</a:t>
+            </a:r>
+          </a:p>
+          <a:p>
+            <a:pPr lvl="1"/>
+            <a:r>
+              <a:rPr lang="pt-BR" dirty="0" smtClean="0"/>
+              <a:t>Superclasse</a:t>
+            </a:r>
+          </a:p>
+          <a:p>
+            <a:pPr lvl="1"/>
+            <a:r>
+              <a:rPr lang="pt-BR" dirty="0" smtClean="0"/>
+              <a:t>Classe base</a:t>
+            </a:r>
+          </a:p>
+          <a:p>
+            <a:pPr lvl="1"/>
+            <a:r>
+              <a:rPr lang="pt-BR" dirty="0" smtClean="0"/>
+              <a:t>Classe pai</a:t>
+            </a:r>
+          </a:p>
+          <a:p>
+            <a:r>
+              <a:rPr lang="pt-BR" dirty="0" smtClean="0"/>
+              <a:t>A classe que </a:t>
+            </a:r>
+            <a:r>
+              <a:rPr lang="pt-BR" dirty="0" smtClean="0">
+                <a:solidFill>
+                  <a:srgbClr val="92D050"/>
+                </a:solidFill>
+              </a:rPr>
+              <a:t>recebe</a:t>
+            </a:r>
+            <a:r>
+              <a:rPr lang="pt-BR" dirty="0" smtClean="0"/>
+              <a:t> os membros é chamada de:</a:t>
+            </a:r>
+          </a:p>
+          <a:p>
+            <a:pPr lvl="1"/>
+            <a:r>
+              <a:rPr lang="pt-BR" dirty="0" smtClean="0"/>
+              <a:t>Subclasse</a:t>
+            </a:r>
+          </a:p>
+          <a:p>
+            <a:pPr lvl="1"/>
+            <a:r>
+              <a:rPr lang="pt-BR" dirty="0" smtClean="0"/>
+              <a:t>Classe derivada</a:t>
+            </a:r>
+          </a:p>
+          <a:p>
+            <a:pPr lvl="1"/>
+            <a:r>
+              <a:rPr lang="pt-BR" dirty="0" smtClean="0"/>
+              <a:t>Classe filho</a:t>
+            </a:r>
+            <a:endParaRPr lang="pt-BR" dirty="0"/>
+          </a:p>
+        </p:txBody>
+      </p:sp>
+    </p:spTree>
+  </p:cSld>
+  <p:clrMapOvr>
+    <a:masterClrMapping/>
+  </p:clrMapOvr>
+</p:sld>
+</file>
+
 <file path=ppt/slides/slide3.xml><?xml version="1.0" encoding="utf-8"?>
 <p:sld xmlns:a="http://schemas.openxmlformats.org/drawingml/2006/main" xmlns:r="http://schemas.openxmlformats.org/officeDocument/2006/relationships" xmlns:p="http://schemas.openxmlformats.org/presentationml/2006/main">
   <p:cSld>
@@ -5925,7 +6812,17 @@
           <a:p>
             <a:r>
               <a:rPr lang="pt-BR" dirty="0" smtClean="0"/>
-              <a:t>Classes em Arquivos Separados</a:t>
+              <a:t>Classes em Arquivos </a:t>
+            </a:r>
+            <a:r>
+              <a:rPr lang="pt-BR" dirty="0" smtClean="0"/>
+              <a:t>Separados</a:t>
+            </a:r>
+          </a:p>
+          <a:p>
+            <a:r>
+              <a:rPr lang="pt-BR" dirty="0" smtClean="0"/>
+              <a:t>Polimorfismo</a:t>
             </a:r>
             <a:endParaRPr lang="pt-BR" dirty="0"/>
           </a:p>
@@ -5943,6 +6840,131 @@
       </p:par>
     </p:tnLst>
   </p:timing>
+</p:sld>
+</file>
+
+<file path=ppt/slides/slide30.xml><?xml version="1.0" encoding="utf-8"?>
+<p:sld xmlns:a="http://schemas.openxmlformats.org/drawingml/2006/main" xmlns:r="http://schemas.openxmlformats.org/officeDocument/2006/relationships" xmlns:p="http://schemas.openxmlformats.org/presentationml/2006/main">
+  <p:cSld>
+    <p:spTree>
+      <p:nvGrpSpPr>
+        <p:cNvPr id="1" name=""/>
+        <p:cNvGrpSpPr/>
+        <p:nvPr/>
+      </p:nvGrpSpPr>
+      <p:grpSpPr>
+        <a:xfrm>
+          <a:off x="0" y="0"/>
+          <a:ext cx="0" cy="0"/>
+          <a:chOff x="0" y="0"/>
+          <a:chExt cx="0" cy="0"/>
+        </a:xfrm>
+      </p:grpSpPr>
+      <p:sp>
+        <p:nvSpPr>
+          <p:cNvPr id="2" name="Título 1"/>
+          <p:cNvSpPr>
+            <a:spLocks noGrp="1"/>
+          </p:cNvSpPr>
+          <p:nvPr>
+            <p:ph type="title"/>
+          </p:nvPr>
+        </p:nvSpPr>
+        <p:spPr/>
+        <p:txBody>
+          <a:bodyPr/>
+          <a:lstStyle/>
+          <a:p>
+            <a:r>
+              <a:rPr lang="pt-BR" dirty="0" smtClean="0"/>
+              <a:t>Herança</a:t>
+            </a:r>
+            <a:endParaRPr lang="pt-BR" dirty="0"/>
+          </a:p>
+        </p:txBody>
+      </p:sp>
+      <p:sp>
+        <p:nvSpPr>
+          <p:cNvPr id="3" name="Espaço Reservado para Conteúdo 2"/>
+          <p:cNvSpPr>
+            <a:spLocks noGrp="1"/>
+          </p:cNvSpPr>
+          <p:nvPr>
+            <p:ph idx="1"/>
+          </p:nvPr>
+        </p:nvSpPr>
+        <p:spPr/>
+        <p:txBody>
+          <a:bodyPr>
+            <a:normAutofit fontScale="92500" lnSpcReduction="10000"/>
+          </a:bodyPr>
+          <a:lstStyle/>
+          <a:p>
+            <a:r>
+              <a:rPr lang="pt-BR" dirty="0" smtClean="0"/>
+              <a:t>Usando herança, podemos criar novas classes a partir de classes já existentes</a:t>
+            </a:r>
+          </a:p>
+          <a:p>
+            <a:r>
+              <a:rPr lang="pt-BR" dirty="0" smtClean="0"/>
+              <a:t>Herança é muito usada para acessar bibliotecas ou componentes</a:t>
+            </a:r>
+          </a:p>
+          <a:p>
+            <a:r>
+              <a:rPr lang="pt-BR" dirty="0" smtClean="0"/>
+              <a:t>Benefícios da herança:</a:t>
+            </a:r>
+          </a:p>
+          <a:p>
+            <a:pPr lvl="1"/>
+            <a:r>
+              <a:rPr lang="pt-BR" dirty="0" smtClean="0">
+                <a:solidFill>
+                  <a:srgbClr val="92D050"/>
+                </a:solidFill>
+              </a:rPr>
+              <a:t>Reaproveitamento de código</a:t>
+            </a:r>
+          </a:p>
+          <a:p>
+            <a:pPr lvl="1"/>
+            <a:r>
+              <a:rPr lang="pt-BR" dirty="0" smtClean="0">
+                <a:solidFill>
+                  <a:srgbClr val="92D050"/>
+                </a:solidFill>
+              </a:rPr>
+              <a:t>Redução da complexidade</a:t>
+            </a:r>
+          </a:p>
+          <a:p>
+            <a:r>
+              <a:rPr lang="pt-BR" dirty="0" smtClean="0"/>
+              <a:t>O construtor da classe filha pode chamar o construtor da classe pai usando a palavra chave </a:t>
+            </a:r>
+            <a:r>
+              <a:rPr lang="pt-BR" dirty="0" smtClean="0">
+                <a:solidFill>
+                  <a:srgbClr val="92D050"/>
+                </a:solidFill>
+              </a:rPr>
+              <a:t>base</a:t>
+            </a:r>
+            <a:endParaRPr lang="pt-BR" dirty="0">
+              <a:solidFill>
+                <a:srgbClr val="92D050"/>
+              </a:solidFill>
+            </a:endParaRPr>
+          </a:p>
+        </p:txBody>
+      </p:sp>
+    </p:spTree>
+  </p:cSld>
+  <p:clrMapOvr>
+    <a:masterClrMapping/>
+  </p:clrMapOvr>
 </p:sld>
 </file>
 

</xml_diff>